<commit_message>
📦 Add custom selection algorithm.
</commit_message>
<xml_diff>
--- a/test/ppt.pptx
+++ b/test/ppt.pptx
@@ -107,6 +107,11 @@
       </a:defRPr>
     </a:lvl9pPr>
   </p:defaultTextStyle>
+  <p:extLst>
+    <p:ext uri="{EFAFB233-063F-42B5-8137-9DF3F51BA10A}">
+      <p15:sldGuideLst xmlns:p15="http://schemas.microsoft.com/office/powerpoint/2012/main"/>
+    </p:ext>
+  </p:extLst>
 </p:presentation>
 </file>
 
@@ -834,7 +839,7 @@
           <a:p>
             <a:fld id="{955FDE93-5FDC-4D90-B7BA-C764366F81D9}" type="datetimeFigureOut">
               <a:rPr lang="zh-CN" altLang="en-US" smtClean="0"/>
-              <a:t>2020/5/9</a:t>
+              <a:t>2020/5/10</a:t>
             </a:fld>
             <a:endParaRPr lang="zh-CN" altLang="en-US"/>
           </a:p>
@@ -1085,7 +1090,7 @@
           <a:p>
             <a:fld id="{955FDE93-5FDC-4D90-B7BA-C764366F81D9}" type="datetimeFigureOut">
               <a:rPr lang="zh-CN" altLang="en-US" smtClean="0"/>
-              <a:t>2020/5/9</a:t>
+              <a:t>2020/5/10</a:t>
             </a:fld>
             <a:endParaRPr lang="zh-CN" altLang="en-US"/>
           </a:p>
@@ -1399,7 +1404,7 @@
           <a:p>
             <a:fld id="{955FDE93-5FDC-4D90-B7BA-C764366F81D9}" type="datetimeFigureOut">
               <a:rPr lang="zh-CN" altLang="en-US" smtClean="0"/>
-              <a:t>2020/5/9</a:t>
+              <a:t>2020/5/10</a:t>
             </a:fld>
             <a:endParaRPr lang="zh-CN" altLang="en-US"/>
           </a:p>
@@ -1726,7 +1731,7 @@
           <a:p>
             <a:fld id="{955FDE93-5FDC-4D90-B7BA-C764366F81D9}" type="datetimeFigureOut">
               <a:rPr lang="zh-CN" altLang="en-US" smtClean="0"/>
-              <a:t>2020/5/9</a:t>
+              <a:t>2020/5/10</a:t>
             </a:fld>
             <a:endParaRPr lang="zh-CN" altLang="en-US"/>
           </a:p>
@@ -2040,7 +2045,7 @@
           <a:p>
             <a:fld id="{955FDE93-5FDC-4D90-B7BA-C764366F81D9}" type="datetimeFigureOut">
               <a:rPr lang="zh-CN" altLang="en-US" smtClean="0"/>
-              <a:t>2020/5/9</a:t>
+              <a:t>2020/5/10</a:t>
             </a:fld>
             <a:endParaRPr lang="zh-CN" altLang="en-US"/>
           </a:p>
@@ -2427,7 +2432,7 @@
           <a:p>
             <a:fld id="{955FDE93-5FDC-4D90-B7BA-C764366F81D9}" type="datetimeFigureOut">
               <a:rPr lang="zh-CN" altLang="en-US" smtClean="0"/>
-              <a:t>2020/5/9</a:t>
+              <a:t>2020/5/10</a:t>
             </a:fld>
             <a:endParaRPr lang="zh-CN" altLang="en-US"/>
           </a:p>
@@ -2597,7 +2602,7 @@
           <a:p>
             <a:fld id="{955FDE93-5FDC-4D90-B7BA-C764366F81D9}" type="datetimeFigureOut">
               <a:rPr lang="zh-CN" altLang="en-US" smtClean="0"/>
-              <a:t>2020/5/9</a:t>
+              <a:t>2020/5/10</a:t>
             </a:fld>
             <a:endParaRPr lang="zh-CN" altLang="en-US"/>
           </a:p>
@@ -2777,7 +2782,7 @@
           <a:p>
             <a:fld id="{955FDE93-5FDC-4D90-B7BA-C764366F81D9}" type="datetimeFigureOut">
               <a:rPr lang="zh-CN" altLang="en-US" smtClean="0"/>
-              <a:t>2020/5/9</a:t>
+              <a:t>2020/5/10</a:t>
             </a:fld>
             <a:endParaRPr lang="zh-CN" altLang="en-US"/>
           </a:p>
@@ -2953,7 +2958,7 @@
           <a:p>
             <a:fld id="{955FDE93-5FDC-4D90-B7BA-C764366F81D9}" type="datetimeFigureOut">
               <a:rPr lang="zh-CN" altLang="en-US" smtClean="0"/>
-              <a:t>2020/5/9</a:t>
+              <a:t>2020/5/10</a:t>
             </a:fld>
             <a:endParaRPr lang="zh-CN" altLang="en-US"/>
           </a:p>
@@ -3200,7 +3205,7 @@
           <a:p>
             <a:fld id="{955FDE93-5FDC-4D90-B7BA-C764366F81D9}" type="datetimeFigureOut">
               <a:rPr lang="zh-CN" altLang="en-US" smtClean="0"/>
-              <a:t>2020/5/9</a:t>
+              <a:t>2020/5/10</a:t>
             </a:fld>
             <a:endParaRPr lang="zh-CN" altLang="en-US"/>
           </a:p>
@@ -3432,7 +3437,7 @@
           <a:p>
             <a:fld id="{955FDE93-5FDC-4D90-B7BA-C764366F81D9}" type="datetimeFigureOut">
               <a:rPr lang="zh-CN" altLang="en-US" smtClean="0"/>
-              <a:t>2020/5/9</a:t>
+              <a:t>2020/5/10</a:t>
             </a:fld>
             <a:endParaRPr lang="zh-CN" altLang="en-US"/>
           </a:p>
@@ -3806,7 +3811,7 @@
           <a:p>
             <a:fld id="{955FDE93-5FDC-4D90-B7BA-C764366F81D9}" type="datetimeFigureOut">
               <a:rPr lang="zh-CN" altLang="en-US" smtClean="0"/>
-              <a:t>2020/5/9</a:t>
+              <a:t>2020/5/10</a:t>
             </a:fld>
             <a:endParaRPr lang="zh-CN" altLang="en-US"/>
           </a:p>
@@ -3929,7 +3934,7 @@
           <a:p>
             <a:fld id="{955FDE93-5FDC-4D90-B7BA-C764366F81D9}" type="datetimeFigureOut">
               <a:rPr lang="zh-CN" altLang="en-US" smtClean="0"/>
-              <a:t>2020/5/9</a:t>
+              <a:t>2020/5/10</a:t>
             </a:fld>
             <a:endParaRPr lang="zh-CN" altLang="en-US"/>
           </a:p>
@@ -4024,7 +4029,7 @@
           <a:p>
             <a:fld id="{955FDE93-5FDC-4D90-B7BA-C764366F81D9}" type="datetimeFigureOut">
               <a:rPr lang="zh-CN" altLang="en-US" smtClean="0"/>
-              <a:t>2020/5/9</a:t>
+              <a:t>2020/5/10</a:t>
             </a:fld>
             <a:endParaRPr lang="zh-CN" altLang="en-US"/>
           </a:p>
@@ -4279,7 +4284,7 @@
           <a:p>
             <a:fld id="{955FDE93-5FDC-4D90-B7BA-C764366F81D9}" type="datetimeFigureOut">
               <a:rPr lang="zh-CN" altLang="en-US" smtClean="0"/>
-              <a:t>2020/5/9</a:t>
+              <a:t>2020/5/10</a:t>
             </a:fld>
             <a:endParaRPr lang="zh-CN" altLang="en-US"/>
           </a:p>
@@ -4542,7 +4547,7 @@
           <a:p>
             <a:fld id="{955FDE93-5FDC-4D90-B7BA-C764366F81D9}" type="datetimeFigureOut">
               <a:rPr lang="zh-CN" altLang="en-US" smtClean="0"/>
-              <a:t>2020/5/9</a:t>
+              <a:t>2020/5/10</a:t>
             </a:fld>
             <a:endParaRPr lang="zh-CN" altLang="en-US"/>
           </a:p>
@@ -5287,7 +5292,7 @@
           <a:p>
             <a:fld id="{955FDE93-5FDC-4D90-B7BA-C764366F81D9}" type="datetimeFigureOut">
               <a:rPr lang="zh-CN" altLang="en-US" smtClean="0"/>
-              <a:t>2020/5/9</a:t>
+              <a:t>2020/5/10</a:t>
             </a:fld>
             <a:endParaRPr lang="zh-CN" altLang="en-US"/>
           </a:p>
@@ -5922,13 +5927,8 @@
           <a:p>
             <a:r>
               <a:rPr lang="zh-CN" altLang="en-US" dirty="0"/>
-              <a:t>标题</a:t>
-            </a:r>
-            <a:r>
-              <a:rPr lang="en-US" altLang="zh-CN" dirty="0"/>
-              <a:t>1</a:t>
-            </a:r>
-            <a:endParaRPr lang="zh-CN" altLang="en-US" dirty="0"/>
+              <a:t>复苏的春雨</a:t>
+            </a:r>
           </a:p>
         </p:txBody>
       </p:sp>
@@ -6026,13 +6026,8 @@
           <a:p>
             <a:r>
               <a:rPr lang="zh-CN" altLang="en-US" dirty="0"/>
-              <a:t>标题</a:t>
-            </a:r>
-            <a:r>
-              <a:rPr lang="en-US" altLang="zh-CN" dirty="0"/>
-              <a:t>1</a:t>
-            </a:r>
-            <a:endParaRPr lang="zh-CN" altLang="en-US" dirty="0"/>
+              <a:t>宁静的夏夜</a:t>
+            </a:r>
           </a:p>
         </p:txBody>
       </p:sp>
@@ -6130,13 +6125,8 @@
           <a:p>
             <a:r>
               <a:rPr lang="zh-CN" altLang="en-US" dirty="0"/>
-              <a:t>标题</a:t>
-            </a:r>
-            <a:r>
-              <a:rPr lang="en-US" altLang="zh-CN" dirty="0"/>
-              <a:t>1</a:t>
-            </a:r>
-            <a:endParaRPr lang="zh-CN" altLang="en-US" dirty="0"/>
+              <a:t>秋冬时节</a:t>
+            </a:r>
           </a:p>
         </p:txBody>
       </p:sp>

</xml_diff>